<commit_message>
Update slide design and links for VSLive Vegas
</commit_message>
<xml_diff>
--- a/2025/0311_VSLiveLasVegas/Choosing a Windows UI Framework/VSLive Vegas 25 - Building a Native Windows App_AlvinAshcraft.pptx
+++ b/2025/0311_VSLiveLasVegas/Choosing a Windows UI Framework/VSLive Vegas 25 - Building a Native Windows App_AlvinAshcraft.pptx
@@ -1,6 +1,6 @@
 
 <file path=ppt/presentation.xml><?xml version="1.0" encoding="utf-8"?>
-<p:presentation xmlns:a="http://schemas.openxmlformats.org/drawingml/2006/main" xmlns:r="http://schemas.openxmlformats.org/officeDocument/2006/relationships" xmlns:p="http://schemas.openxmlformats.org/presentationml/2006/main" removePersonalInfoOnSave="1" saveSubsetFonts="1">
+<p:presentation xmlns:a="http://schemas.openxmlformats.org/drawingml/2006/main" xmlns:r="http://schemas.openxmlformats.org/officeDocument/2006/relationships" xmlns:p="http://schemas.openxmlformats.org/presentationml/2006/main" saveSubsetFonts="1">
   <p:sldMasterIdLst>
     <p:sldMasterId id="2147483682" r:id="rId1"/>
     <p:sldMasterId id="2147483760" r:id="rId2"/>
@@ -4155,7 +4155,7 @@
           <a:p>
             <a:fld id="{D088F999-7A4E-6B4F-9FED-EF75B73AD044}" type="datetimeFigureOut">
               <a:rPr lang="en-US" smtClean="0"/>
-              <a:t>1/31/2025</a:t>
+              <a:t>3/1/2025</a:t>
             </a:fld>
             <a:endParaRPr lang="en-US"/>
           </a:p>
@@ -4323,7 +4323,7 @@
           <a:p>
             <a:fld id="{D088F999-7A4E-6B4F-9FED-EF75B73AD044}" type="datetimeFigureOut">
               <a:rPr lang="en-US" smtClean="0"/>
-              <a:t>1/31/2025</a:t>
+              <a:t>3/1/2025</a:t>
             </a:fld>
             <a:endParaRPr lang="en-US"/>
           </a:p>
@@ -4501,7 +4501,7 @@
           <a:p>
             <a:fld id="{D088F999-7A4E-6B4F-9FED-EF75B73AD044}" type="datetimeFigureOut">
               <a:rPr lang="en-US" smtClean="0"/>
-              <a:t>1/31/2025</a:t>
+              <a:t>3/1/2025</a:t>
             </a:fld>
             <a:endParaRPr lang="en-US"/>
           </a:p>
@@ -4670,7 +4670,7 @@
             <a:fld id="{3FE51E94-D08C-431E-88FC-7EB62E529A19}" type="datetimeFigureOut">
               <a:rPr lang="en-US" smtClean="0"/>
               <a:pPr/>
-              <a:t>1/31/2025</a:t>
+              <a:t>3/1/2025</a:t>
             </a:fld>
             <a:endParaRPr lang="en-US"/>
           </a:p>
@@ -4839,7 +4839,7 @@
           <a:p>
             <a:fld id="{D088F999-7A4E-6B4F-9FED-EF75B73AD044}" type="datetimeFigureOut">
               <a:rPr lang="en-US" smtClean="0"/>
-              <a:t>1/31/2025</a:t>
+              <a:t>3/1/2025</a:t>
             </a:fld>
             <a:endParaRPr lang="en-US"/>
           </a:p>
@@ -5084,7 +5084,7 @@
           <a:p>
             <a:fld id="{D088F999-7A4E-6B4F-9FED-EF75B73AD044}" type="datetimeFigureOut">
               <a:rPr lang="en-US" smtClean="0"/>
-              <a:t>1/31/2025</a:t>
+              <a:t>3/1/2025</a:t>
             </a:fld>
             <a:endParaRPr lang="en-US"/>
           </a:p>
@@ -5369,7 +5369,7 @@
           <a:p>
             <a:fld id="{D088F999-7A4E-6B4F-9FED-EF75B73AD044}" type="datetimeFigureOut">
               <a:rPr lang="en-US" smtClean="0"/>
-              <a:t>1/31/2025</a:t>
+              <a:t>3/1/2025</a:t>
             </a:fld>
             <a:endParaRPr lang="en-US"/>
           </a:p>
@@ -5788,7 +5788,7 @@
           <a:p>
             <a:fld id="{D088F999-7A4E-6B4F-9FED-EF75B73AD044}" type="datetimeFigureOut">
               <a:rPr lang="en-US" smtClean="0"/>
-              <a:t>1/31/2025</a:t>
+              <a:t>3/1/2025</a:t>
             </a:fld>
             <a:endParaRPr lang="en-US"/>
           </a:p>
@@ -5905,7 +5905,7 @@
           <a:p>
             <a:fld id="{D088F999-7A4E-6B4F-9FED-EF75B73AD044}" type="datetimeFigureOut">
               <a:rPr lang="en-US" smtClean="0"/>
-              <a:t>1/31/2025</a:t>
+              <a:t>3/1/2025</a:t>
             </a:fld>
             <a:endParaRPr lang="en-US"/>
           </a:p>
@@ -6000,7 +6000,7 @@
           <a:p>
             <a:fld id="{D088F999-7A4E-6B4F-9FED-EF75B73AD044}" type="datetimeFigureOut">
               <a:rPr lang="en-US" smtClean="0"/>
-              <a:t>1/31/2025</a:t>
+              <a:t>3/1/2025</a:t>
             </a:fld>
             <a:endParaRPr lang="en-US"/>
           </a:p>
@@ -6275,7 +6275,7 @@
           <a:p>
             <a:fld id="{D088F999-7A4E-6B4F-9FED-EF75B73AD044}" type="datetimeFigureOut">
               <a:rPr lang="en-US" smtClean="0"/>
-              <a:t>1/31/2025</a:t>
+              <a:t>3/1/2025</a:t>
             </a:fld>
             <a:endParaRPr lang="en-US"/>
           </a:p>
@@ -6527,7 +6527,7 @@
           <a:p>
             <a:fld id="{D088F999-7A4E-6B4F-9FED-EF75B73AD044}" type="datetimeFigureOut">
               <a:rPr lang="en-US" smtClean="0"/>
-              <a:t>1/31/2025</a:t>
+              <a:t>3/1/2025</a:t>
             </a:fld>
             <a:endParaRPr lang="en-US"/>
           </a:p>
@@ -6747,7 +6747,7 @@
           <a:p>
             <a:fld id="{D088F999-7A4E-6B4F-9FED-EF75B73AD044}" type="datetimeFigureOut">
               <a:rPr lang="en-US" smtClean="0"/>
-              <a:t>1/31/2025</a:t>
+              <a:t>3/1/2025</a:t>
             </a:fld>
             <a:endParaRPr lang="en-US"/>
           </a:p>
@@ -7264,7 +7264,7 @@
           <a:p>
             <a:fld id="{D088F999-7A4E-6B4F-9FED-EF75B73AD044}" type="datetimeFigureOut">
               <a:rPr lang="en-US" smtClean="0"/>
-              <a:t>1/31/2025</a:t>
+              <a:t>3/1/2025</a:t>
             </a:fld>
             <a:endParaRPr lang="en-US"/>
           </a:p>
@@ -8237,6 +8237,40 @@
 <file path=ppt/slides/slide10.xml><?xml version="1.0" encoding="utf-8"?>
 <p:sld xmlns:a="http://schemas.openxmlformats.org/drawingml/2006/main" xmlns:r="http://schemas.openxmlformats.org/officeDocument/2006/relationships" xmlns:p="http://schemas.openxmlformats.org/presentationml/2006/main">
   <p:cSld>
+    <p:bg>
+      <p:bgPr>
+        <a:gradFill>
+          <a:gsLst>
+            <a:gs pos="0">
+              <a:schemeClr val="accent1">
+                <a:lumMod val="5000"/>
+                <a:lumOff val="95000"/>
+              </a:schemeClr>
+            </a:gs>
+            <a:gs pos="74000">
+              <a:schemeClr val="accent1">
+                <a:lumMod val="45000"/>
+                <a:lumOff val="55000"/>
+              </a:schemeClr>
+            </a:gs>
+            <a:gs pos="83000">
+              <a:schemeClr val="accent1">
+                <a:lumMod val="45000"/>
+                <a:lumOff val="55000"/>
+              </a:schemeClr>
+            </a:gs>
+            <a:gs pos="100000">
+              <a:schemeClr val="accent1">
+                <a:lumMod val="30000"/>
+                <a:lumOff val="70000"/>
+              </a:schemeClr>
+            </a:gs>
+          </a:gsLst>
+          <a:lin ang="5400000" scaled="1"/>
+        </a:gradFill>
+        <a:effectLst/>
+      </p:bgPr>
+    </p:bg>
     <p:spTree>
       <p:nvGrpSpPr>
         <p:cNvPr id="1" name=""/>
@@ -8424,6 +8458,40 @@
 <file path=ppt/slides/slide11.xml><?xml version="1.0" encoding="utf-8"?>
 <p:sld xmlns:a="http://schemas.openxmlformats.org/drawingml/2006/main" xmlns:r="http://schemas.openxmlformats.org/officeDocument/2006/relationships" xmlns:p="http://schemas.openxmlformats.org/presentationml/2006/main">
   <p:cSld>
+    <p:bg>
+      <p:bgPr>
+        <a:gradFill>
+          <a:gsLst>
+            <a:gs pos="0">
+              <a:schemeClr val="accent1">
+                <a:lumMod val="5000"/>
+                <a:lumOff val="95000"/>
+              </a:schemeClr>
+            </a:gs>
+            <a:gs pos="74000">
+              <a:schemeClr val="accent1">
+                <a:lumMod val="45000"/>
+                <a:lumOff val="55000"/>
+              </a:schemeClr>
+            </a:gs>
+            <a:gs pos="83000">
+              <a:schemeClr val="accent1">
+                <a:lumMod val="45000"/>
+                <a:lumOff val="55000"/>
+              </a:schemeClr>
+            </a:gs>
+            <a:gs pos="100000">
+              <a:schemeClr val="accent1">
+                <a:lumMod val="30000"/>
+                <a:lumOff val="70000"/>
+              </a:schemeClr>
+            </a:gs>
+          </a:gsLst>
+          <a:lin ang="5400000" scaled="1"/>
+        </a:gradFill>
+        <a:effectLst/>
+      </p:bgPr>
+    </p:bg>
     <p:spTree>
       <p:nvGrpSpPr>
         <p:cNvPr id="1" name=""/>
@@ -8555,6 +8623,40 @@
 <file path=ppt/slides/slide12.xml><?xml version="1.0" encoding="utf-8"?>
 <p:sld xmlns:a="http://schemas.openxmlformats.org/drawingml/2006/main" xmlns:r="http://schemas.openxmlformats.org/officeDocument/2006/relationships" xmlns:p="http://schemas.openxmlformats.org/presentationml/2006/main">
   <p:cSld>
+    <p:bg>
+      <p:bgPr>
+        <a:gradFill>
+          <a:gsLst>
+            <a:gs pos="0">
+              <a:schemeClr val="accent1">
+                <a:lumMod val="5000"/>
+                <a:lumOff val="95000"/>
+              </a:schemeClr>
+            </a:gs>
+            <a:gs pos="74000">
+              <a:schemeClr val="accent1">
+                <a:lumMod val="45000"/>
+                <a:lumOff val="55000"/>
+              </a:schemeClr>
+            </a:gs>
+            <a:gs pos="83000">
+              <a:schemeClr val="accent1">
+                <a:lumMod val="45000"/>
+                <a:lumOff val="55000"/>
+              </a:schemeClr>
+            </a:gs>
+            <a:gs pos="100000">
+              <a:schemeClr val="accent1">
+                <a:lumMod val="30000"/>
+                <a:lumOff val="70000"/>
+              </a:schemeClr>
+            </a:gs>
+          </a:gsLst>
+          <a:lin ang="5400000" scaled="1"/>
+        </a:gradFill>
+        <a:effectLst/>
+      </p:bgPr>
+    </p:bg>
     <p:spTree>
       <p:nvGrpSpPr>
         <p:cNvPr id="1" name=""/>
@@ -8702,6 +8804,40 @@
 <file path=ppt/slides/slide13.xml><?xml version="1.0" encoding="utf-8"?>
 <p:sld xmlns:a="http://schemas.openxmlformats.org/drawingml/2006/main" xmlns:r="http://schemas.openxmlformats.org/officeDocument/2006/relationships" xmlns:p="http://schemas.openxmlformats.org/presentationml/2006/main">
   <p:cSld>
+    <p:bg>
+      <p:bgPr>
+        <a:gradFill>
+          <a:gsLst>
+            <a:gs pos="0">
+              <a:schemeClr val="accent1">
+                <a:lumMod val="5000"/>
+                <a:lumOff val="95000"/>
+              </a:schemeClr>
+            </a:gs>
+            <a:gs pos="74000">
+              <a:schemeClr val="accent1">
+                <a:lumMod val="45000"/>
+                <a:lumOff val="55000"/>
+              </a:schemeClr>
+            </a:gs>
+            <a:gs pos="83000">
+              <a:schemeClr val="accent1">
+                <a:lumMod val="45000"/>
+                <a:lumOff val="55000"/>
+              </a:schemeClr>
+            </a:gs>
+            <a:gs pos="100000">
+              <a:schemeClr val="accent1">
+                <a:lumMod val="30000"/>
+                <a:lumOff val="70000"/>
+              </a:schemeClr>
+            </a:gs>
+          </a:gsLst>
+          <a:lin ang="5400000" scaled="1"/>
+        </a:gradFill>
+        <a:effectLst/>
+      </p:bgPr>
+    </p:bg>
     <p:spTree>
       <p:nvGrpSpPr>
         <p:cNvPr id="1" name=""/>
@@ -8865,6 +9001,40 @@
 <file path=ppt/slides/slide14.xml><?xml version="1.0" encoding="utf-8"?>
 <p:sld xmlns:a="http://schemas.openxmlformats.org/drawingml/2006/main" xmlns:r="http://schemas.openxmlformats.org/officeDocument/2006/relationships" xmlns:p="http://schemas.openxmlformats.org/presentationml/2006/main">
   <p:cSld>
+    <p:bg>
+      <p:bgPr>
+        <a:gradFill>
+          <a:gsLst>
+            <a:gs pos="0">
+              <a:schemeClr val="accent1">
+                <a:lumMod val="5000"/>
+                <a:lumOff val="95000"/>
+              </a:schemeClr>
+            </a:gs>
+            <a:gs pos="74000">
+              <a:schemeClr val="accent1">
+                <a:lumMod val="45000"/>
+                <a:lumOff val="55000"/>
+              </a:schemeClr>
+            </a:gs>
+            <a:gs pos="83000">
+              <a:schemeClr val="accent1">
+                <a:lumMod val="45000"/>
+                <a:lumOff val="55000"/>
+              </a:schemeClr>
+            </a:gs>
+            <a:gs pos="100000">
+              <a:schemeClr val="accent1">
+                <a:lumMod val="30000"/>
+                <a:lumOff val="70000"/>
+              </a:schemeClr>
+            </a:gs>
+          </a:gsLst>
+          <a:lin ang="5400000" scaled="1"/>
+        </a:gradFill>
+        <a:effectLst/>
+      </p:bgPr>
+    </p:bg>
     <p:spTree>
       <p:nvGrpSpPr>
         <p:cNvPr id="1" name=""/>
@@ -9106,6 +9276,40 @@
 <file path=ppt/slides/slide15.xml><?xml version="1.0" encoding="utf-8"?>
 <p:sld xmlns:a="http://schemas.openxmlformats.org/drawingml/2006/main" xmlns:r="http://schemas.openxmlformats.org/officeDocument/2006/relationships" xmlns:p="http://schemas.openxmlformats.org/presentationml/2006/main">
   <p:cSld>
+    <p:bg>
+      <p:bgPr>
+        <a:gradFill>
+          <a:gsLst>
+            <a:gs pos="0">
+              <a:schemeClr val="accent1">
+                <a:lumMod val="5000"/>
+                <a:lumOff val="95000"/>
+              </a:schemeClr>
+            </a:gs>
+            <a:gs pos="74000">
+              <a:schemeClr val="accent1">
+                <a:lumMod val="45000"/>
+                <a:lumOff val="55000"/>
+              </a:schemeClr>
+            </a:gs>
+            <a:gs pos="83000">
+              <a:schemeClr val="accent1">
+                <a:lumMod val="45000"/>
+                <a:lumOff val="55000"/>
+              </a:schemeClr>
+            </a:gs>
+            <a:gs pos="100000">
+              <a:schemeClr val="accent1">
+                <a:lumMod val="30000"/>
+                <a:lumOff val="70000"/>
+              </a:schemeClr>
+            </a:gs>
+          </a:gsLst>
+          <a:lin ang="5400000" scaled="1"/>
+        </a:gradFill>
+        <a:effectLst/>
+      </p:bgPr>
+    </p:bg>
     <p:spTree>
       <p:nvGrpSpPr>
         <p:cNvPr id="1" name=""/>
@@ -9266,6 +9470,40 @@
 <file path=ppt/slides/slide16.xml><?xml version="1.0" encoding="utf-8"?>
 <p:sld xmlns:a="http://schemas.openxmlformats.org/drawingml/2006/main" xmlns:r="http://schemas.openxmlformats.org/officeDocument/2006/relationships" xmlns:p="http://schemas.openxmlformats.org/presentationml/2006/main">
   <p:cSld>
+    <p:bg>
+      <p:bgPr>
+        <a:gradFill>
+          <a:gsLst>
+            <a:gs pos="0">
+              <a:schemeClr val="accent1">
+                <a:lumMod val="5000"/>
+                <a:lumOff val="95000"/>
+              </a:schemeClr>
+            </a:gs>
+            <a:gs pos="74000">
+              <a:schemeClr val="accent1">
+                <a:lumMod val="45000"/>
+                <a:lumOff val="55000"/>
+              </a:schemeClr>
+            </a:gs>
+            <a:gs pos="83000">
+              <a:schemeClr val="accent1">
+                <a:lumMod val="45000"/>
+                <a:lumOff val="55000"/>
+              </a:schemeClr>
+            </a:gs>
+            <a:gs pos="100000">
+              <a:schemeClr val="accent1">
+                <a:lumMod val="30000"/>
+                <a:lumOff val="70000"/>
+              </a:schemeClr>
+            </a:gs>
+          </a:gsLst>
+          <a:lin ang="5400000" scaled="1"/>
+        </a:gradFill>
+        <a:effectLst/>
+      </p:bgPr>
+    </p:bg>
     <p:spTree>
       <p:nvGrpSpPr>
         <p:cNvPr id="1" name=""/>
@@ -9510,6 +9748,40 @@
 <file path=ppt/slides/slide17.xml><?xml version="1.0" encoding="utf-8"?>
 <p:sld xmlns:a="http://schemas.openxmlformats.org/drawingml/2006/main" xmlns:r="http://schemas.openxmlformats.org/officeDocument/2006/relationships" xmlns:p="http://schemas.openxmlformats.org/presentationml/2006/main">
   <p:cSld>
+    <p:bg>
+      <p:bgPr>
+        <a:gradFill>
+          <a:gsLst>
+            <a:gs pos="0">
+              <a:schemeClr val="accent1">
+                <a:lumMod val="5000"/>
+                <a:lumOff val="95000"/>
+              </a:schemeClr>
+            </a:gs>
+            <a:gs pos="74000">
+              <a:schemeClr val="accent1">
+                <a:lumMod val="45000"/>
+                <a:lumOff val="55000"/>
+              </a:schemeClr>
+            </a:gs>
+            <a:gs pos="83000">
+              <a:schemeClr val="accent1">
+                <a:lumMod val="45000"/>
+                <a:lumOff val="55000"/>
+              </a:schemeClr>
+            </a:gs>
+            <a:gs pos="100000">
+              <a:schemeClr val="accent1">
+                <a:lumMod val="30000"/>
+                <a:lumOff val="70000"/>
+              </a:schemeClr>
+            </a:gs>
+          </a:gsLst>
+          <a:lin ang="5400000" scaled="1"/>
+        </a:gradFill>
+        <a:effectLst/>
+      </p:bgPr>
+    </p:bg>
     <p:spTree>
       <p:nvGrpSpPr>
         <p:cNvPr id="1" name=""/>
@@ -9658,6 +9930,40 @@
 <file path=ppt/slides/slide18.xml><?xml version="1.0" encoding="utf-8"?>
 <p:sld xmlns:a="http://schemas.openxmlformats.org/drawingml/2006/main" xmlns:r="http://schemas.openxmlformats.org/officeDocument/2006/relationships" xmlns:p="http://schemas.openxmlformats.org/presentationml/2006/main">
   <p:cSld>
+    <p:bg>
+      <p:bgPr>
+        <a:gradFill>
+          <a:gsLst>
+            <a:gs pos="0">
+              <a:schemeClr val="accent1">
+                <a:lumMod val="5000"/>
+                <a:lumOff val="95000"/>
+              </a:schemeClr>
+            </a:gs>
+            <a:gs pos="74000">
+              <a:schemeClr val="accent1">
+                <a:lumMod val="45000"/>
+                <a:lumOff val="55000"/>
+              </a:schemeClr>
+            </a:gs>
+            <a:gs pos="83000">
+              <a:schemeClr val="accent1">
+                <a:lumMod val="45000"/>
+                <a:lumOff val="55000"/>
+              </a:schemeClr>
+            </a:gs>
+            <a:gs pos="100000">
+              <a:schemeClr val="accent1">
+                <a:lumMod val="30000"/>
+                <a:lumOff val="70000"/>
+              </a:schemeClr>
+            </a:gs>
+          </a:gsLst>
+          <a:lin ang="5400000" scaled="1"/>
+        </a:gradFill>
+        <a:effectLst/>
+      </p:bgPr>
+    </p:bg>
     <p:spTree>
       <p:nvGrpSpPr>
         <p:cNvPr id="1" name=""/>
@@ -10087,6 +10393,40 @@
 <file path=ppt/slides/slide19.xml><?xml version="1.0" encoding="utf-8"?>
 <p:sld xmlns:a="http://schemas.openxmlformats.org/drawingml/2006/main" xmlns:r="http://schemas.openxmlformats.org/officeDocument/2006/relationships" xmlns:p="http://schemas.openxmlformats.org/presentationml/2006/main">
   <p:cSld>
+    <p:bg>
+      <p:bgPr>
+        <a:gradFill>
+          <a:gsLst>
+            <a:gs pos="0">
+              <a:schemeClr val="accent1">
+                <a:lumMod val="5000"/>
+                <a:lumOff val="95000"/>
+              </a:schemeClr>
+            </a:gs>
+            <a:gs pos="74000">
+              <a:schemeClr val="accent1">
+                <a:lumMod val="45000"/>
+                <a:lumOff val="55000"/>
+              </a:schemeClr>
+            </a:gs>
+            <a:gs pos="83000">
+              <a:schemeClr val="accent1">
+                <a:lumMod val="45000"/>
+                <a:lumOff val="55000"/>
+              </a:schemeClr>
+            </a:gs>
+            <a:gs pos="100000">
+              <a:schemeClr val="accent1">
+                <a:lumMod val="30000"/>
+                <a:lumOff val="70000"/>
+              </a:schemeClr>
+            </a:gs>
+          </a:gsLst>
+          <a:lin ang="5400000" scaled="1"/>
+        </a:gradFill>
+        <a:effectLst/>
+      </p:bgPr>
+    </p:bg>
     <p:spTree>
       <p:nvGrpSpPr>
         <p:cNvPr id="1" name=""/>
@@ -10390,6 +10730,40 @@
 <file path=ppt/slides/slide2.xml><?xml version="1.0" encoding="utf-8"?>
 <p:sld xmlns:a="http://schemas.openxmlformats.org/drawingml/2006/main" xmlns:r="http://schemas.openxmlformats.org/officeDocument/2006/relationships" xmlns:p="http://schemas.openxmlformats.org/presentationml/2006/main">
   <p:cSld>
+    <p:bg>
+      <p:bgPr>
+        <a:gradFill>
+          <a:gsLst>
+            <a:gs pos="0">
+              <a:schemeClr val="accent1">
+                <a:lumMod val="5000"/>
+                <a:lumOff val="95000"/>
+              </a:schemeClr>
+            </a:gs>
+            <a:gs pos="74000">
+              <a:schemeClr val="accent1">
+                <a:lumMod val="45000"/>
+                <a:lumOff val="55000"/>
+              </a:schemeClr>
+            </a:gs>
+            <a:gs pos="83000">
+              <a:schemeClr val="accent1">
+                <a:lumMod val="45000"/>
+                <a:lumOff val="55000"/>
+              </a:schemeClr>
+            </a:gs>
+            <a:gs pos="100000">
+              <a:schemeClr val="accent1">
+                <a:lumMod val="30000"/>
+                <a:lumOff val="70000"/>
+              </a:schemeClr>
+            </a:gs>
+          </a:gsLst>
+          <a:lin ang="5400000" scaled="1"/>
+        </a:gradFill>
+        <a:effectLst/>
+      </p:bgPr>
+    </p:bg>
     <p:spTree>
       <p:nvGrpSpPr>
         <p:cNvPr id="1" name=""/>
@@ -10687,6 +11061,40 @@
 <file path=ppt/slides/slide20.xml><?xml version="1.0" encoding="utf-8"?>
 <p:sld xmlns:a="http://schemas.openxmlformats.org/drawingml/2006/main" xmlns:r="http://schemas.openxmlformats.org/officeDocument/2006/relationships" xmlns:p="http://schemas.openxmlformats.org/presentationml/2006/main">
   <p:cSld>
+    <p:bg>
+      <p:bgPr>
+        <a:gradFill>
+          <a:gsLst>
+            <a:gs pos="0">
+              <a:schemeClr val="accent1">
+                <a:lumMod val="5000"/>
+                <a:lumOff val="95000"/>
+              </a:schemeClr>
+            </a:gs>
+            <a:gs pos="74000">
+              <a:schemeClr val="accent1">
+                <a:lumMod val="45000"/>
+                <a:lumOff val="55000"/>
+              </a:schemeClr>
+            </a:gs>
+            <a:gs pos="83000">
+              <a:schemeClr val="accent1">
+                <a:lumMod val="45000"/>
+                <a:lumOff val="55000"/>
+              </a:schemeClr>
+            </a:gs>
+            <a:gs pos="100000">
+              <a:schemeClr val="accent1">
+                <a:lumMod val="30000"/>
+                <a:lumOff val="70000"/>
+              </a:schemeClr>
+            </a:gs>
+          </a:gsLst>
+          <a:lin ang="5400000" scaled="1"/>
+        </a:gradFill>
+        <a:effectLst/>
+      </p:bgPr>
+    </p:bg>
     <p:spTree>
       <p:nvGrpSpPr>
         <p:cNvPr id="1" name=""/>
@@ -10894,6 +11302,40 @@
 <file path=ppt/slides/slide21.xml><?xml version="1.0" encoding="utf-8"?>
 <p:sld xmlns:a="http://schemas.openxmlformats.org/drawingml/2006/main" xmlns:r="http://schemas.openxmlformats.org/officeDocument/2006/relationships" xmlns:p="http://schemas.openxmlformats.org/presentationml/2006/main">
   <p:cSld>
+    <p:bg>
+      <p:bgPr>
+        <a:gradFill>
+          <a:gsLst>
+            <a:gs pos="0">
+              <a:schemeClr val="accent1">
+                <a:lumMod val="5000"/>
+                <a:lumOff val="95000"/>
+              </a:schemeClr>
+            </a:gs>
+            <a:gs pos="74000">
+              <a:schemeClr val="accent1">
+                <a:lumMod val="45000"/>
+                <a:lumOff val="55000"/>
+              </a:schemeClr>
+            </a:gs>
+            <a:gs pos="83000">
+              <a:schemeClr val="accent1">
+                <a:lumMod val="45000"/>
+                <a:lumOff val="55000"/>
+              </a:schemeClr>
+            </a:gs>
+            <a:gs pos="100000">
+              <a:schemeClr val="accent1">
+                <a:lumMod val="30000"/>
+                <a:lumOff val="70000"/>
+              </a:schemeClr>
+            </a:gs>
+          </a:gsLst>
+          <a:lin ang="5400000" scaled="1"/>
+        </a:gradFill>
+        <a:effectLst/>
+      </p:bgPr>
+    </p:bg>
     <p:spTree>
       <p:nvGrpSpPr>
         <p:cNvPr id="1" name=""/>
@@ -11147,6 +11589,40 @@
 <file path=ppt/slides/slide22.xml><?xml version="1.0" encoding="utf-8"?>
 <p:sld xmlns:a="http://schemas.openxmlformats.org/drawingml/2006/main" xmlns:r="http://schemas.openxmlformats.org/officeDocument/2006/relationships" xmlns:p="http://schemas.openxmlformats.org/presentationml/2006/main">
   <p:cSld>
+    <p:bg>
+      <p:bgPr>
+        <a:gradFill>
+          <a:gsLst>
+            <a:gs pos="0">
+              <a:schemeClr val="accent1">
+                <a:lumMod val="5000"/>
+                <a:lumOff val="95000"/>
+              </a:schemeClr>
+            </a:gs>
+            <a:gs pos="74000">
+              <a:schemeClr val="accent1">
+                <a:lumMod val="45000"/>
+                <a:lumOff val="55000"/>
+              </a:schemeClr>
+            </a:gs>
+            <a:gs pos="83000">
+              <a:schemeClr val="accent1">
+                <a:lumMod val="45000"/>
+                <a:lumOff val="55000"/>
+              </a:schemeClr>
+            </a:gs>
+            <a:gs pos="100000">
+              <a:schemeClr val="accent1">
+                <a:lumMod val="30000"/>
+                <a:lumOff val="70000"/>
+              </a:schemeClr>
+            </a:gs>
+          </a:gsLst>
+          <a:lin ang="5400000" scaled="1"/>
+        </a:gradFill>
+        <a:effectLst/>
+      </p:bgPr>
+    </p:bg>
     <p:spTree>
       <p:nvGrpSpPr>
         <p:cNvPr id="1" name=""/>
@@ -11281,6 +11757,40 @@
 <file path=ppt/slides/slide23.xml><?xml version="1.0" encoding="utf-8"?>
 <p:sld xmlns:a="http://schemas.openxmlformats.org/drawingml/2006/main" xmlns:r="http://schemas.openxmlformats.org/officeDocument/2006/relationships" xmlns:p="http://schemas.openxmlformats.org/presentationml/2006/main">
   <p:cSld>
+    <p:bg>
+      <p:bgPr>
+        <a:gradFill>
+          <a:gsLst>
+            <a:gs pos="0">
+              <a:schemeClr val="accent1">
+                <a:lumMod val="5000"/>
+                <a:lumOff val="95000"/>
+              </a:schemeClr>
+            </a:gs>
+            <a:gs pos="74000">
+              <a:schemeClr val="accent1">
+                <a:lumMod val="45000"/>
+                <a:lumOff val="55000"/>
+              </a:schemeClr>
+            </a:gs>
+            <a:gs pos="83000">
+              <a:schemeClr val="accent1">
+                <a:lumMod val="45000"/>
+                <a:lumOff val="55000"/>
+              </a:schemeClr>
+            </a:gs>
+            <a:gs pos="100000">
+              <a:schemeClr val="accent1">
+                <a:lumMod val="30000"/>
+                <a:lumOff val="70000"/>
+              </a:schemeClr>
+            </a:gs>
+          </a:gsLst>
+          <a:lin ang="5400000" scaled="1"/>
+        </a:gradFill>
+        <a:effectLst/>
+      </p:bgPr>
+    </p:bg>
     <p:spTree>
       <p:nvGrpSpPr>
         <p:cNvPr id="1" name="">
@@ -11584,6 +12094,40 @@
 <file path=ppt/slides/slide3.xml><?xml version="1.0" encoding="utf-8"?>
 <p:sld xmlns:a="http://schemas.openxmlformats.org/drawingml/2006/main" xmlns:r="http://schemas.openxmlformats.org/officeDocument/2006/relationships" xmlns:p="http://schemas.openxmlformats.org/presentationml/2006/main">
   <p:cSld>
+    <p:bg>
+      <p:bgPr>
+        <a:gradFill>
+          <a:gsLst>
+            <a:gs pos="0">
+              <a:schemeClr val="accent1">
+                <a:lumMod val="5000"/>
+                <a:lumOff val="95000"/>
+              </a:schemeClr>
+            </a:gs>
+            <a:gs pos="74000">
+              <a:schemeClr val="accent1">
+                <a:lumMod val="45000"/>
+                <a:lumOff val="55000"/>
+              </a:schemeClr>
+            </a:gs>
+            <a:gs pos="83000">
+              <a:schemeClr val="accent1">
+                <a:lumMod val="45000"/>
+                <a:lumOff val="55000"/>
+              </a:schemeClr>
+            </a:gs>
+            <a:gs pos="100000">
+              <a:schemeClr val="accent1">
+                <a:lumMod val="30000"/>
+                <a:lumOff val="70000"/>
+              </a:schemeClr>
+            </a:gs>
+          </a:gsLst>
+          <a:lin ang="5400000" scaled="1"/>
+        </a:gradFill>
+        <a:effectLst/>
+      </p:bgPr>
+    </p:bg>
     <p:spTree>
       <p:nvGrpSpPr>
         <p:cNvPr id="1" name=""/>
@@ -11690,6 +12234,40 @@
 <file path=ppt/slides/slide4.xml><?xml version="1.0" encoding="utf-8"?>
 <p:sld xmlns:a="http://schemas.openxmlformats.org/drawingml/2006/main" xmlns:r="http://schemas.openxmlformats.org/officeDocument/2006/relationships" xmlns:p="http://schemas.openxmlformats.org/presentationml/2006/main">
   <p:cSld>
+    <p:bg>
+      <p:bgPr>
+        <a:gradFill>
+          <a:gsLst>
+            <a:gs pos="0">
+              <a:schemeClr val="accent1">
+                <a:lumMod val="5000"/>
+                <a:lumOff val="95000"/>
+              </a:schemeClr>
+            </a:gs>
+            <a:gs pos="74000">
+              <a:schemeClr val="accent1">
+                <a:lumMod val="45000"/>
+                <a:lumOff val="55000"/>
+              </a:schemeClr>
+            </a:gs>
+            <a:gs pos="83000">
+              <a:schemeClr val="accent1">
+                <a:lumMod val="45000"/>
+                <a:lumOff val="55000"/>
+              </a:schemeClr>
+            </a:gs>
+            <a:gs pos="100000">
+              <a:schemeClr val="accent1">
+                <a:lumMod val="30000"/>
+                <a:lumOff val="70000"/>
+              </a:schemeClr>
+            </a:gs>
+          </a:gsLst>
+          <a:lin ang="5400000" scaled="1"/>
+        </a:gradFill>
+        <a:effectLst/>
+      </p:bgPr>
+    </p:bg>
     <p:spTree>
       <p:nvGrpSpPr>
         <p:cNvPr id="1" name=""/>
@@ -11850,6 +12428,40 @@
 <file path=ppt/slides/slide5.xml><?xml version="1.0" encoding="utf-8"?>
 <p:sld xmlns:a="http://schemas.openxmlformats.org/drawingml/2006/main" xmlns:r="http://schemas.openxmlformats.org/officeDocument/2006/relationships" xmlns:p="http://schemas.openxmlformats.org/presentationml/2006/main">
   <p:cSld>
+    <p:bg>
+      <p:bgPr>
+        <a:gradFill>
+          <a:gsLst>
+            <a:gs pos="0">
+              <a:schemeClr val="accent1">
+                <a:lumMod val="5000"/>
+                <a:lumOff val="95000"/>
+              </a:schemeClr>
+            </a:gs>
+            <a:gs pos="74000">
+              <a:schemeClr val="accent1">
+                <a:lumMod val="45000"/>
+                <a:lumOff val="55000"/>
+              </a:schemeClr>
+            </a:gs>
+            <a:gs pos="83000">
+              <a:schemeClr val="accent1">
+                <a:lumMod val="45000"/>
+                <a:lumOff val="55000"/>
+              </a:schemeClr>
+            </a:gs>
+            <a:gs pos="100000">
+              <a:schemeClr val="accent1">
+                <a:lumMod val="30000"/>
+                <a:lumOff val="70000"/>
+              </a:schemeClr>
+            </a:gs>
+          </a:gsLst>
+          <a:lin ang="5400000" scaled="1"/>
+        </a:gradFill>
+        <a:effectLst/>
+      </p:bgPr>
+    </p:bg>
     <p:spTree>
       <p:nvGrpSpPr>
         <p:cNvPr id="1" name=""/>
@@ -12081,6 +12693,40 @@
 <file path=ppt/slides/slide6.xml><?xml version="1.0" encoding="utf-8"?>
 <p:sld xmlns:a="http://schemas.openxmlformats.org/drawingml/2006/main" xmlns:r="http://schemas.openxmlformats.org/officeDocument/2006/relationships" xmlns:p="http://schemas.openxmlformats.org/presentationml/2006/main">
   <p:cSld>
+    <p:bg>
+      <p:bgPr>
+        <a:gradFill>
+          <a:gsLst>
+            <a:gs pos="0">
+              <a:schemeClr val="accent1">
+                <a:lumMod val="5000"/>
+                <a:lumOff val="95000"/>
+              </a:schemeClr>
+            </a:gs>
+            <a:gs pos="74000">
+              <a:schemeClr val="accent1">
+                <a:lumMod val="45000"/>
+                <a:lumOff val="55000"/>
+              </a:schemeClr>
+            </a:gs>
+            <a:gs pos="83000">
+              <a:schemeClr val="accent1">
+                <a:lumMod val="45000"/>
+                <a:lumOff val="55000"/>
+              </a:schemeClr>
+            </a:gs>
+            <a:gs pos="100000">
+              <a:schemeClr val="accent1">
+                <a:lumMod val="30000"/>
+                <a:lumOff val="70000"/>
+              </a:schemeClr>
+            </a:gs>
+          </a:gsLst>
+          <a:lin ang="5400000" scaled="1"/>
+        </a:gradFill>
+        <a:effectLst/>
+      </p:bgPr>
+    </p:bg>
     <p:spTree>
       <p:nvGrpSpPr>
         <p:cNvPr id="1" name=""/>
@@ -12219,6 +12865,40 @@
 <file path=ppt/slides/slide7.xml><?xml version="1.0" encoding="utf-8"?>
 <p:sld xmlns:a="http://schemas.openxmlformats.org/drawingml/2006/main" xmlns:r="http://schemas.openxmlformats.org/officeDocument/2006/relationships" xmlns:p="http://schemas.openxmlformats.org/presentationml/2006/main">
   <p:cSld>
+    <p:bg>
+      <p:bgPr>
+        <a:gradFill>
+          <a:gsLst>
+            <a:gs pos="0">
+              <a:schemeClr val="accent1">
+                <a:lumMod val="5000"/>
+                <a:lumOff val="95000"/>
+              </a:schemeClr>
+            </a:gs>
+            <a:gs pos="74000">
+              <a:schemeClr val="accent1">
+                <a:lumMod val="45000"/>
+                <a:lumOff val="55000"/>
+              </a:schemeClr>
+            </a:gs>
+            <a:gs pos="83000">
+              <a:schemeClr val="accent1">
+                <a:lumMod val="45000"/>
+                <a:lumOff val="55000"/>
+              </a:schemeClr>
+            </a:gs>
+            <a:gs pos="100000">
+              <a:schemeClr val="accent1">
+                <a:lumMod val="30000"/>
+                <a:lumOff val="70000"/>
+              </a:schemeClr>
+            </a:gs>
+          </a:gsLst>
+          <a:lin ang="5400000" scaled="1"/>
+        </a:gradFill>
+        <a:effectLst/>
+      </p:bgPr>
+    </p:bg>
     <p:spTree>
       <p:nvGrpSpPr>
         <p:cNvPr id="1" name=""/>
@@ -12458,6 +13138,40 @@
 <file path=ppt/slides/slide8.xml><?xml version="1.0" encoding="utf-8"?>
 <p:sld xmlns:a="http://schemas.openxmlformats.org/drawingml/2006/main" xmlns:r="http://schemas.openxmlformats.org/officeDocument/2006/relationships" xmlns:p="http://schemas.openxmlformats.org/presentationml/2006/main">
   <p:cSld>
+    <p:bg>
+      <p:bgPr>
+        <a:gradFill>
+          <a:gsLst>
+            <a:gs pos="0">
+              <a:schemeClr val="accent1">
+                <a:lumMod val="5000"/>
+                <a:lumOff val="95000"/>
+              </a:schemeClr>
+            </a:gs>
+            <a:gs pos="74000">
+              <a:schemeClr val="accent1">
+                <a:lumMod val="45000"/>
+                <a:lumOff val="55000"/>
+              </a:schemeClr>
+            </a:gs>
+            <a:gs pos="83000">
+              <a:schemeClr val="accent1">
+                <a:lumMod val="45000"/>
+                <a:lumOff val="55000"/>
+              </a:schemeClr>
+            </a:gs>
+            <a:gs pos="100000">
+              <a:schemeClr val="accent1">
+                <a:lumMod val="30000"/>
+                <a:lumOff val="70000"/>
+              </a:schemeClr>
+            </a:gs>
+          </a:gsLst>
+          <a:lin ang="5400000" scaled="1"/>
+        </a:gradFill>
+        <a:effectLst/>
+      </p:bgPr>
+    </p:bg>
     <p:spTree>
       <p:nvGrpSpPr>
         <p:cNvPr id="1" name=""/>
@@ -12660,6 +13374,40 @@
 <file path=ppt/slides/slide9.xml><?xml version="1.0" encoding="utf-8"?>
 <p:sld xmlns:a="http://schemas.openxmlformats.org/drawingml/2006/main" xmlns:r="http://schemas.openxmlformats.org/officeDocument/2006/relationships" xmlns:p="http://schemas.openxmlformats.org/presentationml/2006/main">
   <p:cSld>
+    <p:bg>
+      <p:bgPr>
+        <a:gradFill>
+          <a:gsLst>
+            <a:gs pos="0">
+              <a:schemeClr val="accent1">
+                <a:lumMod val="5000"/>
+                <a:lumOff val="95000"/>
+              </a:schemeClr>
+            </a:gs>
+            <a:gs pos="74000">
+              <a:schemeClr val="accent1">
+                <a:lumMod val="45000"/>
+                <a:lumOff val="55000"/>
+              </a:schemeClr>
+            </a:gs>
+            <a:gs pos="83000">
+              <a:schemeClr val="accent1">
+                <a:lumMod val="45000"/>
+                <a:lumOff val="55000"/>
+              </a:schemeClr>
+            </a:gs>
+            <a:gs pos="100000">
+              <a:schemeClr val="accent1">
+                <a:lumMod val="30000"/>
+                <a:lumOff val="70000"/>
+              </a:schemeClr>
+            </a:gs>
+          </a:gsLst>
+          <a:lin ang="5400000" scaled="1"/>
+        </a:gradFill>
+        <a:effectLst/>
+      </p:bgPr>
+    </p:bg>
     <p:spTree>
       <p:nvGrpSpPr>
         <p:cNvPr id="1" name=""/>

</xml_diff>